<commit_message>
Final updates to first session
Added quick walkthrough for downloading materials from GitHub.
</commit_message>
<xml_diff>
--- a/Session 1 - Introduction to MATLAB/MATLAB Session 1.pptx
+++ b/Session 1 - Introduction to MATLAB/MATLAB Session 1.pptx
@@ -4415,25 +4415,6 @@
               <a:rPr lang="en-GB" sz="2800" dirty="0"/>
               <a:t>Session 1: Introduction</a:t>
             </a:r>
-            <a:endParaRPr lang="en-GB" dirty="0"/>
-          </a:p>
-        </p:txBody>
-      </p:sp>
-      <p:sp>
-        <p:nvSpPr>
-          <p:cNvPr id="3" name="Subtitle 2"/>
-          <p:cNvSpPr>
-            <a:spLocks noGrp="1"/>
-          </p:cNvSpPr>
-          <p:nvPr>
-            <p:ph type="subTitle" idx="1"/>
-          </p:nvPr>
-        </p:nvSpPr>
-        <p:spPr/>
-        <p:txBody>
-          <a:bodyPr/>
-          <a:lstStyle/>
-          <a:p>
             <a:endParaRPr lang="en-GB" dirty="0"/>
           </a:p>
         </p:txBody>
@@ -14316,68 +14297,494 @@
           </a:p>
         </p:txBody>
       </p:sp>
-      <p:sp>
-        <p:nvSpPr>
-          <p:cNvPr id="9" name="Content Placeholder 8">
+      <p:pic>
+        <p:nvPicPr>
+          <p:cNvPr id="7" name="Picture 6">
             <a:extLst>
               <a:ext uri="{FF2B5EF4-FFF2-40B4-BE49-F238E27FC236}">
-                <a16:creationId xmlns:a16="http://schemas.microsoft.com/office/drawing/2014/main" id="{4C98BF7B-AC5D-4070-A333-89DEFEF791F0}"/>
+                <a16:creationId xmlns:a16="http://schemas.microsoft.com/office/drawing/2014/main" id="{B6A85D5F-6403-4C40-824F-5E743C91BDBC}"/>
               </a:ext>
             </a:extLst>
           </p:cNvPr>
-          <p:cNvSpPr>
-            <a:spLocks noGrp="1"/>
+          <p:cNvPicPr>
+            <a:picLocks noChangeAspect="1"/>
+          </p:cNvPicPr>
+          <p:nvPr/>
+        </p:nvPicPr>
+        <p:blipFill>
+          <a:blip r:embed="rId2"/>
+          <a:stretch>
+            <a:fillRect/>
+          </a:stretch>
+        </p:blipFill>
+        <p:spPr>
+          <a:xfrm>
+            <a:off x="3400663" y="1232598"/>
+            <a:ext cx="5390674" cy="4332446"/>
+          </a:xfrm>
+          <a:prstGeom prst="rect">
+            <a:avLst/>
+          </a:prstGeom>
+        </p:spPr>
+      </p:pic>
+      <p:sp>
+        <p:nvSpPr>
+          <p:cNvPr id="10" name="Content Placeholder 2">
+            <a:extLst>
+              <a:ext uri="{FF2B5EF4-FFF2-40B4-BE49-F238E27FC236}">
+                <a16:creationId xmlns:a16="http://schemas.microsoft.com/office/drawing/2014/main" id="{B9F10DC0-1353-4862-AFEF-A432FE1E0AF3}"/>
+              </a:ext>
+            </a:extLst>
+          </p:cNvPr>
+          <p:cNvSpPr txBox="1">
+            <a:spLocks/>
           </p:cNvSpPr>
-          <p:nvPr>
-            <p:ph idx="1"/>
-          </p:nvPr>
+          <p:nvPr/>
         </p:nvSpPr>
-        <p:spPr/>
+        <p:spPr>
+          <a:xfrm>
+            <a:off x="2451788" y="5603956"/>
+            <a:ext cx="7288424" cy="452508"/>
+          </a:xfrm>
+          <a:prstGeom prst="rect">
+            <a:avLst/>
+          </a:prstGeom>
+        </p:spPr>
         <p:txBody>
           <a:bodyPr/>
-          <a:lstStyle/>
-          <a:p>
-            <a:pPr marL="0" indent="0">
-              <a:buNone/>
-            </a:pPr>
-            <a:endParaRPr lang="en-GB" dirty="0">
-              <a:solidFill>
-                <a:srgbClr val="FF0000"/>
-              </a:solidFill>
-            </a:endParaRPr>
-          </a:p>
-          <a:p>
-            <a:pPr marL="0" indent="0">
-              <a:buNone/>
-            </a:pPr>
-            <a:endParaRPr lang="en-GB" dirty="0">
-              <a:solidFill>
-                <a:srgbClr val="FF0000"/>
-              </a:solidFill>
-            </a:endParaRPr>
-          </a:p>
-          <a:p>
-            <a:pPr marL="0" indent="0">
-              <a:buNone/>
-            </a:pPr>
-            <a:endParaRPr lang="en-GB" dirty="0">
-              <a:solidFill>
-                <a:srgbClr val="FF0000"/>
-              </a:solidFill>
-            </a:endParaRPr>
-          </a:p>
+          <a:lstStyle>
+            <a:lvl1pPr marL="342900" indent="-342900" algn="l" rtl="0" eaLnBrk="1" fontAlgn="base" hangingPunct="1">
+              <a:spcBef>
+                <a:spcPct val="20000"/>
+              </a:spcBef>
+              <a:spcAft>
+                <a:spcPct val="0"/>
+              </a:spcAft>
+              <a:buFont typeface="Arial" panose="020B0604020202020204" pitchFamily="34" charset="0"/>
+              <a:buChar char="•"/>
+              <a:defRPr sz="3200" kern="1200">
+                <a:solidFill>
+                  <a:schemeClr val="tx1"/>
+                </a:solidFill>
+                <a:latin typeface="+mn-lt"/>
+                <a:ea typeface="+mn-ea"/>
+                <a:cs typeface="+mn-cs"/>
+              </a:defRPr>
+            </a:lvl1pPr>
+            <a:lvl2pPr marL="742950" indent="-285750" algn="l" rtl="0" eaLnBrk="1" fontAlgn="base" hangingPunct="1">
+              <a:spcBef>
+                <a:spcPct val="20000"/>
+              </a:spcBef>
+              <a:spcAft>
+                <a:spcPct val="0"/>
+              </a:spcAft>
+              <a:buFont typeface="Arial" panose="020B0604020202020204" pitchFamily="34" charset="0"/>
+              <a:buChar char="•"/>
+              <a:defRPr sz="2800" kern="1200">
+                <a:solidFill>
+                  <a:srgbClr val="BF2F37"/>
+                </a:solidFill>
+                <a:latin typeface="+mn-lt"/>
+                <a:ea typeface="+mn-ea"/>
+                <a:cs typeface="+mn-cs"/>
+              </a:defRPr>
+            </a:lvl2pPr>
+            <a:lvl3pPr marL="1143000" indent="-228600" algn="l" rtl="0" eaLnBrk="1" fontAlgn="base" hangingPunct="1">
+              <a:spcBef>
+                <a:spcPct val="20000"/>
+              </a:spcBef>
+              <a:spcAft>
+                <a:spcPct val="0"/>
+              </a:spcAft>
+              <a:buFont typeface="Arial" panose="020B0604020202020204" pitchFamily="34" charset="0"/>
+              <a:buChar char="•"/>
+              <a:defRPr sz="2400" kern="1200">
+                <a:solidFill>
+                  <a:schemeClr val="tx1"/>
+                </a:solidFill>
+                <a:latin typeface="+mn-lt"/>
+                <a:ea typeface="+mn-ea"/>
+                <a:cs typeface="+mn-cs"/>
+              </a:defRPr>
+            </a:lvl3pPr>
+            <a:lvl4pPr marL="1600200" indent="-228600" algn="l" rtl="0" eaLnBrk="1" fontAlgn="base" hangingPunct="1">
+              <a:spcBef>
+                <a:spcPct val="20000"/>
+              </a:spcBef>
+              <a:spcAft>
+                <a:spcPct val="0"/>
+              </a:spcAft>
+              <a:buFont typeface="Arial" panose="020B0604020202020204" pitchFamily="34" charset="0"/>
+              <a:buChar char="–"/>
+              <a:defRPr sz="2000" kern="1200">
+                <a:solidFill>
+                  <a:schemeClr val="tx1"/>
+                </a:solidFill>
+                <a:latin typeface="+mn-lt"/>
+                <a:ea typeface="+mn-ea"/>
+                <a:cs typeface="+mn-cs"/>
+              </a:defRPr>
+            </a:lvl4pPr>
+            <a:lvl5pPr marL="2057400" indent="-228600" algn="l" rtl="0" eaLnBrk="1" fontAlgn="base" hangingPunct="1">
+              <a:spcBef>
+                <a:spcPct val="20000"/>
+              </a:spcBef>
+              <a:spcAft>
+                <a:spcPct val="0"/>
+              </a:spcAft>
+              <a:buFont typeface="Arial" pitchFamily="34" charset="0"/>
+              <a:buChar char="­"/>
+              <a:defRPr sz="2000" kern="1200">
+                <a:solidFill>
+                  <a:schemeClr val="tx1"/>
+                </a:solidFill>
+                <a:latin typeface="+mn-lt"/>
+                <a:ea typeface="+mn-ea"/>
+                <a:cs typeface="+mn-cs"/>
+              </a:defRPr>
+            </a:lvl5pPr>
+            <a:lvl6pPr marL="2514600" indent="-228600" algn="l" defTabSz="914400" rtl="0" eaLnBrk="1" latinLnBrk="0" hangingPunct="1">
+              <a:spcBef>
+                <a:spcPct val="20000"/>
+              </a:spcBef>
+              <a:buFont typeface="Arial" pitchFamily="34" charset="0"/>
+              <a:buChar char="•"/>
+              <a:defRPr sz="2000" kern="1200">
+                <a:solidFill>
+                  <a:schemeClr val="tx1"/>
+                </a:solidFill>
+                <a:latin typeface="+mn-lt"/>
+                <a:ea typeface="+mn-ea"/>
+                <a:cs typeface="+mn-cs"/>
+              </a:defRPr>
+            </a:lvl6pPr>
+            <a:lvl7pPr marL="2971800" indent="-228600" algn="l" defTabSz="914400" rtl="0" eaLnBrk="1" latinLnBrk="0" hangingPunct="1">
+              <a:spcBef>
+                <a:spcPct val="20000"/>
+              </a:spcBef>
+              <a:buFont typeface="Arial" pitchFamily="34" charset="0"/>
+              <a:buChar char="•"/>
+              <a:defRPr sz="2000" kern="1200">
+                <a:solidFill>
+                  <a:schemeClr val="tx1"/>
+                </a:solidFill>
+                <a:latin typeface="+mn-lt"/>
+                <a:ea typeface="+mn-ea"/>
+                <a:cs typeface="+mn-cs"/>
+              </a:defRPr>
+            </a:lvl7pPr>
+            <a:lvl8pPr marL="3429000" indent="-228600" algn="l" defTabSz="914400" rtl="0" eaLnBrk="1" latinLnBrk="0" hangingPunct="1">
+              <a:spcBef>
+                <a:spcPct val="20000"/>
+              </a:spcBef>
+              <a:buFont typeface="Arial" pitchFamily="34" charset="0"/>
+              <a:buChar char="•"/>
+              <a:defRPr sz="2000" kern="1200">
+                <a:solidFill>
+                  <a:schemeClr val="tx1"/>
+                </a:solidFill>
+                <a:latin typeface="+mn-lt"/>
+                <a:ea typeface="+mn-ea"/>
+                <a:cs typeface="+mn-cs"/>
+              </a:defRPr>
+            </a:lvl8pPr>
+            <a:lvl9pPr marL="3886200" indent="-228600" algn="l" defTabSz="914400" rtl="0" eaLnBrk="1" latinLnBrk="0" hangingPunct="1">
+              <a:spcBef>
+                <a:spcPct val="20000"/>
+              </a:spcBef>
+              <a:buFont typeface="Arial" pitchFamily="34" charset="0"/>
+              <a:buChar char="•"/>
+              <a:defRPr sz="2000" kern="1200">
+                <a:solidFill>
+                  <a:schemeClr val="tx1"/>
+                </a:solidFill>
+                <a:latin typeface="+mn-lt"/>
+                <a:ea typeface="+mn-ea"/>
+                <a:cs typeface="+mn-cs"/>
+              </a:defRPr>
+            </a:lvl9pPr>
+          </a:lstStyle>
           <a:p>
             <a:pPr marL="0" indent="0" algn="ctr">
               <a:buNone/>
             </a:pPr>
             <a:r>
-              <a:rPr lang="en-GB" dirty="0">
-                <a:solidFill>
-                  <a:srgbClr val="FF0000"/>
+              <a:rPr lang="en-GB" sz="2400" dirty="0">
+                <a:solidFill>
+                  <a:srgbClr val="BF2F37"/>
                 </a:solidFill>
               </a:rPr>
-              <a:t>ADD SCREENSHOTS FROM GITHUB</a:t>
-            </a:r>
+              <a:t>https://github.com/SJCross/MATLAB-course</a:t>
+            </a:r>
+            <a:endParaRPr lang="en-GB" sz="2000" dirty="0"/>
+          </a:p>
+        </p:txBody>
+      </p:sp>
+      <p:pic>
+        <p:nvPicPr>
+          <p:cNvPr id="8" name="Picture 7">
+            <a:extLst>
+              <a:ext uri="{FF2B5EF4-FFF2-40B4-BE49-F238E27FC236}">
+                <a16:creationId xmlns:a16="http://schemas.microsoft.com/office/drawing/2014/main" id="{E59E5AB0-686C-43ED-AB1D-B0902EECFEDB}"/>
+              </a:ext>
+            </a:extLst>
+          </p:cNvPr>
+          <p:cNvPicPr>
+            <a:picLocks noChangeAspect="1"/>
+          </p:cNvPicPr>
+          <p:nvPr/>
+        </p:nvPicPr>
+        <p:blipFill>
+          <a:blip r:embed="rId3"/>
+          <a:stretch>
+            <a:fillRect/>
+          </a:stretch>
+        </p:blipFill>
+        <p:spPr>
+          <a:xfrm>
+            <a:off x="3400663" y="1232598"/>
+            <a:ext cx="5390674" cy="4332446"/>
+          </a:xfrm>
+          <a:prstGeom prst="rect">
+            <a:avLst/>
+          </a:prstGeom>
+        </p:spPr>
+      </p:pic>
+      <p:sp>
+        <p:nvSpPr>
+          <p:cNvPr id="12" name="Rectangle 11">
+            <a:extLst>
+              <a:ext uri="{FF2B5EF4-FFF2-40B4-BE49-F238E27FC236}">
+                <a16:creationId xmlns:a16="http://schemas.microsoft.com/office/drawing/2014/main" id="{87C64DA8-0942-436E-8055-1C218C8D5D06}"/>
+              </a:ext>
+            </a:extLst>
+          </p:cNvPr>
+          <p:cNvSpPr/>
+          <p:nvPr/>
+        </p:nvSpPr>
+        <p:spPr>
+          <a:xfrm>
+            <a:off x="3485913" y="3762038"/>
+            <a:ext cx="1350406" cy="183371"/>
+          </a:xfrm>
+          <a:prstGeom prst="rect">
+            <a:avLst/>
+          </a:prstGeom>
+          <a:noFill/>
+          <a:ln>
+            <a:solidFill>
+              <a:srgbClr val="FF0000"/>
+            </a:solidFill>
+          </a:ln>
+        </p:spPr>
+        <p:style>
+          <a:lnRef idx="2">
+            <a:schemeClr val="accent1">
+              <a:shade val="50000"/>
+            </a:schemeClr>
+          </a:lnRef>
+          <a:fillRef idx="1">
+            <a:schemeClr val="accent1"/>
+          </a:fillRef>
+          <a:effectRef idx="0">
+            <a:schemeClr val="accent1"/>
+          </a:effectRef>
+          <a:fontRef idx="minor">
+            <a:schemeClr val="lt1"/>
+          </a:fontRef>
+        </p:style>
+        <p:txBody>
+          <a:bodyPr rtlCol="0" anchor="ctr"/>
+          <a:lstStyle/>
+          <a:p>
+            <a:pPr algn="ctr"/>
+            <a:endParaRPr lang="en-GB"/>
+          </a:p>
+        </p:txBody>
+      </p:sp>
+      <p:sp>
+        <p:nvSpPr>
+          <p:cNvPr id="13" name="Rectangle 12">
+            <a:extLst>
+              <a:ext uri="{FF2B5EF4-FFF2-40B4-BE49-F238E27FC236}">
+                <a16:creationId xmlns:a16="http://schemas.microsoft.com/office/drawing/2014/main" id="{070DDD6D-0B6C-4963-BE20-5F8195762728}"/>
+              </a:ext>
+            </a:extLst>
+          </p:cNvPr>
+          <p:cNvSpPr/>
+          <p:nvPr/>
+        </p:nvSpPr>
+        <p:spPr>
+          <a:xfrm>
+            <a:off x="3536713" y="3444538"/>
+            <a:ext cx="946387" cy="183371"/>
+          </a:xfrm>
+          <a:prstGeom prst="rect">
+            <a:avLst/>
+          </a:prstGeom>
+          <a:noFill/>
+          <a:ln>
+            <a:solidFill>
+              <a:srgbClr val="FF0000"/>
+            </a:solidFill>
+          </a:ln>
+        </p:spPr>
+        <p:style>
+          <a:lnRef idx="2">
+            <a:schemeClr val="accent1">
+              <a:shade val="50000"/>
+            </a:schemeClr>
+          </a:lnRef>
+          <a:fillRef idx="1">
+            <a:schemeClr val="accent1"/>
+          </a:fillRef>
+          <a:effectRef idx="0">
+            <a:schemeClr val="accent1"/>
+          </a:effectRef>
+          <a:fontRef idx="minor">
+            <a:schemeClr val="lt1"/>
+          </a:fontRef>
+        </p:style>
+        <p:txBody>
+          <a:bodyPr rtlCol="0" anchor="ctr"/>
+          <a:lstStyle/>
+          <a:p>
+            <a:pPr algn="ctr"/>
+            <a:endParaRPr lang="en-GB"/>
+          </a:p>
+        </p:txBody>
+      </p:sp>
+      <p:pic>
+        <p:nvPicPr>
+          <p:cNvPr id="14" name="Picture 13">
+            <a:extLst>
+              <a:ext uri="{FF2B5EF4-FFF2-40B4-BE49-F238E27FC236}">
+                <a16:creationId xmlns:a16="http://schemas.microsoft.com/office/drawing/2014/main" id="{6404C326-1AFE-4EF7-A5E4-B2DF2BB37C6A}"/>
+              </a:ext>
+            </a:extLst>
+          </p:cNvPr>
+          <p:cNvPicPr>
+            <a:picLocks noChangeAspect="1"/>
+          </p:cNvPicPr>
+          <p:nvPr/>
+        </p:nvPicPr>
+        <p:blipFill>
+          <a:blip r:embed="rId4"/>
+          <a:stretch>
+            <a:fillRect/>
+          </a:stretch>
+        </p:blipFill>
+        <p:spPr>
+          <a:xfrm>
+            <a:off x="3400663" y="1232598"/>
+            <a:ext cx="5390674" cy="4332446"/>
+          </a:xfrm>
+          <a:prstGeom prst="rect">
+            <a:avLst/>
+          </a:prstGeom>
+        </p:spPr>
+      </p:pic>
+      <p:sp>
+        <p:nvSpPr>
+          <p:cNvPr id="15" name="Rectangle 14">
+            <a:extLst>
+              <a:ext uri="{FF2B5EF4-FFF2-40B4-BE49-F238E27FC236}">
+                <a16:creationId xmlns:a16="http://schemas.microsoft.com/office/drawing/2014/main" id="{CC27E54A-D197-4B0B-BB04-91DA6FA6FBBE}"/>
+              </a:ext>
+            </a:extLst>
+          </p:cNvPr>
+          <p:cNvSpPr/>
+          <p:nvPr/>
+        </p:nvSpPr>
+        <p:spPr>
+          <a:xfrm>
+            <a:off x="7509114" y="3224002"/>
+            <a:ext cx="439499" cy="183371"/>
+          </a:xfrm>
+          <a:prstGeom prst="rect">
+            <a:avLst/>
+          </a:prstGeom>
+          <a:noFill/>
+          <a:ln>
+            <a:solidFill>
+              <a:srgbClr val="FF0000"/>
+            </a:solidFill>
+          </a:ln>
+        </p:spPr>
+        <p:style>
+          <a:lnRef idx="2">
+            <a:schemeClr val="accent1">
+              <a:shade val="50000"/>
+            </a:schemeClr>
+          </a:lnRef>
+          <a:fillRef idx="1">
+            <a:schemeClr val="accent1"/>
+          </a:fillRef>
+          <a:effectRef idx="0">
+            <a:schemeClr val="accent1"/>
+          </a:effectRef>
+          <a:fontRef idx="minor">
+            <a:schemeClr val="lt1"/>
+          </a:fontRef>
+        </p:style>
+        <p:txBody>
+          <a:bodyPr rtlCol="0" anchor="ctr"/>
+          <a:lstStyle/>
+          <a:p>
+            <a:pPr algn="ctr"/>
+            <a:endParaRPr lang="en-GB"/>
+          </a:p>
+        </p:txBody>
+      </p:sp>
+      <p:sp>
+        <p:nvSpPr>
+          <p:cNvPr id="11" name="Rectangle 10">
+            <a:extLst>
+              <a:ext uri="{FF2B5EF4-FFF2-40B4-BE49-F238E27FC236}">
+                <a16:creationId xmlns:a16="http://schemas.microsoft.com/office/drawing/2014/main" id="{EB887451-8D95-44FE-811F-26606317639A}"/>
+              </a:ext>
+            </a:extLst>
+          </p:cNvPr>
+          <p:cNvSpPr/>
+          <p:nvPr/>
+        </p:nvSpPr>
+        <p:spPr>
+          <a:xfrm>
+            <a:off x="7882494" y="3152666"/>
+            <a:ext cx="751919" cy="183371"/>
+          </a:xfrm>
+          <a:prstGeom prst="rect">
+            <a:avLst/>
+          </a:prstGeom>
+          <a:noFill/>
+          <a:ln>
+            <a:solidFill>
+              <a:srgbClr val="FF0000"/>
+            </a:solidFill>
+          </a:ln>
+        </p:spPr>
+        <p:style>
+          <a:lnRef idx="2">
+            <a:schemeClr val="accent1">
+              <a:shade val="50000"/>
+            </a:schemeClr>
+          </a:lnRef>
+          <a:fillRef idx="1">
+            <a:schemeClr val="accent1"/>
+          </a:fillRef>
+          <a:effectRef idx="0">
+            <a:schemeClr val="accent1"/>
+          </a:effectRef>
+          <a:fontRef idx="minor">
+            <a:schemeClr val="lt1"/>
+          </a:fontRef>
+        </p:style>
+        <p:txBody>
+          <a:bodyPr rtlCol="0" anchor="ctr"/>
+          <a:lstStyle/>
+          <a:p>
+            <a:pPr algn="ctr"/>
+            <a:endParaRPr lang="en-GB"/>
           </a:p>
         </p:txBody>
       </p:sp>
@@ -14403,6 +14810,468 @@
       </p:transition>
     </mc:Fallback>
   </mc:AlternateContent>
+  <p:timing>
+    <p:tnLst>
+      <p:par>
+        <p:cTn id="1" dur="indefinite" restart="never" nodeType="tmRoot">
+          <p:childTnLst>
+            <p:seq concurrent="1" nextAc="seek">
+              <p:cTn id="2" dur="indefinite" nodeType="mainSeq">
+                <p:childTnLst>
+                  <p:par>
+                    <p:cTn id="3" fill="hold">
+                      <p:stCondLst>
+                        <p:cond delay="indefinite"/>
+                      </p:stCondLst>
+                      <p:childTnLst>
+                        <p:par>
+                          <p:cTn id="4" fill="hold">
+                            <p:stCondLst>
+                              <p:cond delay="0"/>
+                            </p:stCondLst>
+                            <p:childTnLst>
+                              <p:par>
+                                <p:cTn id="5" presetID="10" presetClass="entr" presetSubtype="0" fill="hold" grpId="0" nodeType="clickEffect">
+                                  <p:stCondLst>
+                                    <p:cond delay="0"/>
+                                  </p:stCondLst>
+                                  <p:childTnLst>
+                                    <p:set>
+                                      <p:cBhvr>
+                                        <p:cTn id="6" dur="1" fill="hold">
+                                          <p:stCondLst>
+                                            <p:cond delay="0"/>
+                                          </p:stCondLst>
+                                        </p:cTn>
+                                        <p:tgtEl>
+                                          <p:spTgt spid="11"/>
+                                        </p:tgtEl>
+                                        <p:attrNameLst>
+                                          <p:attrName>style.visibility</p:attrName>
+                                        </p:attrNameLst>
+                                      </p:cBhvr>
+                                      <p:to>
+                                        <p:strVal val="visible"/>
+                                      </p:to>
+                                    </p:set>
+                                    <p:animEffect transition="in" filter="fade">
+                                      <p:cBhvr>
+                                        <p:cTn id="7" dur="300"/>
+                                        <p:tgtEl>
+                                          <p:spTgt spid="11"/>
+                                        </p:tgtEl>
+                                      </p:cBhvr>
+                                    </p:animEffect>
+                                  </p:childTnLst>
+                                </p:cTn>
+                              </p:par>
+                            </p:childTnLst>
+                          </p:cTn>
+                        </p:par>
+                      </p:childTnLst>
+                    </p:cTn>
+                  </p:par>
+                  <p:par>
+                    <p:cTn id="8" fill="hold">
+                      <p:stCondLst>
+                        <p:cond delay="indefinite"/>
+                      </p:stCondLst>
+                      <p:childTnLst>
+                        <p:par>
+                          <p:cTn id="9" fill="hold">
+                            <p:stCondLst>
+                              <p:cond delay="0"/>
+                            </p:stCondLst>
+                            <p:childTnLst>
+                              <p:par>
+                                <p:cTn id="10" presetID="10" presetClass="entr" presetSubtype="0" fill="hold" grpId="0" nodeType="clickEffect">
+                                  <p:stCondLst>
+                                    <p:cond delay="0"/>
+                                  </p:stCondLst>
+                                  <p:childTnLst>
+                                    <p:set>
+                                      <p:cBhvr>
+                                        <p:cTn id="11" dur="1" fill="hold">
+                                          <p:stCondLst>
+                                            <p:cond delay="0"/>
+                                          </p:stCondLst>
+                                        </p:cTn>
+                                        <p:tgtEl>
+                                          <p:spTgt spid="12"/>
+                                        </p:tgtEl>
+                                        <p:attrNameLst>
+                                          <p:attrName>style.visibility</p:attrName>
+                                        </p:attrNameLst>
+                                      </p:cBhvr>
+                                      <p:to>
+                                        <p:strVal val="visible"/>
+                                      </p:to>
+                                    </p:set>
+                                    <p:animEffect transition="in" filter="fade">
+                                      <p:cBhvr>
+                                        <p:cTn id="12" dur="300"/>
+                                        <p:tgtEl>
+                                          <p:spTgt spid="12"/>
+                                        </p:tgtEl>
+                                      </p:cBhvr>
+                                    </p:animEffect>
+                                  </p:childTnLst>
+                                </p:cTn>
+                              </p:par>
+                              <p:par>
+                                <p:cTn id="13" presetID="10" presetClass="exit" presetSubtype="0" fill="hold" grpId="1" nodeType="withEffect">
+                                  <p:stCondLst>
+                                    <p:cond delay="0"/>
+                                  </p:stCondLst>
+                                  <p:childTnLst>
+                                    <p:animEffect transition="out" filter="fade">
+                                      <p:cBhvr>
+                                        <p:cTn id="14" dur="300"/>
+                                        <p:tgtEl>
+                                          <p:spTgt spid="11"/>
+                                        </p:tgtEl>
+                                      </p:cBhvr>
+                                    </p:animEffect>
+                                    <p:set>
+                                      <p:cBhvr>
+                                        <p:cTn id="15" dur="1" fill="hold">
+                                          <p:stCondLst>
+                                            <p:cond delay="299"/>
+                                          </p:stCondLst>
+                                        </p:cTn>
+                                        <p:tgtEl>
+                                          <p:spTgt spid="11"/>
+                                        </p:tgtEl>
+                                        <p:attrNameLst>
+                                          <p:attrName>style.visibility</p:attrName>
+                                        </p:attrNameLst>
+                                      </p:cBhvr>
+                                      <p:to>
+                                        <p:strVal val="hidden"/>
+                                      </p:to>
+                                    </p:set>
+                                  </p:childTnLst>
+                                </p:cTn>
+                              </p:par>
+                            </p:childTnLst>
+                          </p:cTn>
+                        </p:par>
+                      </p:childTnLst>
+                    </p:cTn>
+                  </p:par>
+                  <p:par>
+                    <p:cTn id="16" fill="hold">
+                      <p:stCondLst>
+                        <p:cond delay="indefinite"/>
+                      </p:stCondLst>
+                      <p:childTnLst>
+                        <p:par>
+                          <p:cTn id="17" fill="hold">
+                            <p:stCondLst>
+                              <p:cond delay="0"/>
+                            </p:stCondLst>
+                            <p:childTnLst>
+                              <p:par>
+                                <p:cTn id="18" presetID="10" presetClass="entr" presetSubtype="0" fill="hold" nodeType="clickEffect">
+                                  <p:stCondLst>
+                                    <p:cond delay="0"/>
+                                  </p:stCondLst>
+                                  <p:childTnLst>
+                                    <p:set>
+                                      <p:cBhvr>
+                                        <p:cTn id="19" dur="1" fill="hold">
+                                          <p:stCondLst>
+                                            <p:cond delay="0"/>
+                                          </p:stCondLst>
+                                        </p:cTn>
+                                        <p:tgtEl>
+                                          <p:spTgt spid="8"/>
+                                        </p:tgtEl>
+                                        <p:attrNameLst>
+                                          <p:attrName>style.visibility</p:attrName>
+                                        </p:attrNameLst>
+                                      </p:cBhvr>
+                                      <p:to>
+                                        <p:strVal val="visible"/>
+                                      </p:to>
+                                    </p:set>
+                                    <p:animEffect transition="in" filter="fade">
+                                      <p:cBhvr>
+                                        <p:cTn id="20" dur="300"/>
+                                        <p:tgtEl>
+                                          <p:spTgt spid="8"/>
+                                        </p:tgtEl>
+                                      </p:cBhvr>
+                                    </p:animEffect>
+                                  </p:childTnLst>
+                                </p:cTn>
+                              </p:par>
+                              <p:par>
+                                <p:cTn id="21" presetID="10" presetClass="exit" presetSubtype="0" fill="hold" grpId="1" nodeType="withEffect">
+                                  <p:stCondLst>
+                                    <p:cond delay="0"/>
+                                  </p:stCondLst>
+                                  <p:childTnLst>
+                                    <p:animEffect transition="out" filter="fade">
+                                      <p:cBhvr>
+                                        <p:cTn id="22" dur="300"/>
+                                        <p:tgtEl>
+                                          <p:spTgt spid="12"/>
+                                        </p:tgtEl>
+                                      </p:cBhvr>
+                                    </p:animEffect>
+                                    <p:set>
+                                      <p:cBhvr>
+                                        <p:cTn id="23" dur="1" fill="hold">
+                                          <p:stCondLst>
+                                            <p:cond delay="299"/>
+                                          </p:stCondLst>
+                                        </p:cTn>
+                                        <p:tgtEl>
+                                          <p:spTgt spid="12"/>
+                                        </p:tgtEl>
+                                        <p:attrNameLst>
+                                          <p:attrName>style.visibility</p:attrName>
+                                        </p:attrNameLst>
+                                      </p:cBhvr>
+                                      <p:to>
+                                        <p:strVal val="hidden"/>
+                                      </p:to>
+                                    </p:set>
+                                  </p:childTnLst>
+                                </p:cTn>
+                              </p:par>
+                            </p:childTnLst>
+                          </p:cTn>
+                        </p:par>
+                      </p:childTnLst>
+                    </p:cTn>
+                  </p:par>
+                  <p:par>
+                    <p:cTn id="24" fill="hold">
+                      <p:stCondLst>
+                        <p:cond delay="indefinite"/>
+                      </p:stCondLst>
+                      <p:childTnLst>
+                        <p:par>
+                          <p:cTn id="25" fill="hold">
+                            <p:stCondLst>
+                              <p:cond delay="0"/>
+                            </p:stCondLst>
+                            <p:childTnLst>
+                              <p:par>
+                                <p:cTn id="26" presetID="10" presetClass="entr" presetSubtype="0" fill="hold" grpId="0" nodeType="clickEffect">
+                                  <p:stCondLst>
+                                    <p:cond delay="0"/>
+                                  </p:stCondLst>
+                                  <p:childTnLst>
+                                    <p:set>
+                                      <p:cBhvr>
+                                        <p:cTn id="27" dur="1" fill="hold">
+                                          <p:stCondLst>
+                                            <p:cond delay="0"/>
+                                          </p:stCondLst>
+                                        </p:cTn>
+                                        <p:tgtEl>
+                                          <p:spTgt spid="13"/>
+                                        </p:tgtEl>
+                                        <p:attrNameLst>
+                                          <p:attrName>style.visibility</p:attrName>
+                                        </p:attrNameLst>
+                                      </p:cBhvr>
+                                      <p:to>
+                                        <p:strVal val="visible"/>
+                                      </p:to>
+                                    </p:set>
+                                    <p:animEffect transition="in" filter="fade">
+                                      <p:cBhvr>
+                                        <p:cTn id="28" dur="300"/>
+                                        <p:tgtEl>
+                                          <p:spTgt spid="13"/>
+                                        </p:tgtEl>
+                                      </p:cBhvr>
+                                    </p:animEffect>
+                                  </p:childTnLst>
+                                </p:cTn>
+                              </p:par>
+                            </p:childTnLst>
+                          </p:cTn>
+                        </p:par>
+                      </p:childTnLst>
+                    </p:cTn>
+                  </p:par>
+                  <p:par>
+                    <p:cTn id="29" fill="hold">
+                      <p:stCondLst>
+                        <p:cond delay="indefinite"/>
+                      </p:stCondLst>
+                      <p:childTnLst>
+                        <p:par>
+                          <p:cTn id="30" fill="hold">
+                            <p:stCondLst>
+                              <p:cond delay="0"/>
+                            </p:stCondLst>
+                            <p:childTnLst>
+                              <p:par>
+                                <p:cTn id="31" presetID="10" presetClass="entr" presetSubtype="0" fill="hold" nodeType="clickEffect">
+                                  <p:stCondLst>
+                                    <p:cond delay="0"/>
+                                  </p:stCondLst>
+                                  <p:childTnLst>
+                                    <p:set>
+                                      <p:cBhvr>
+                                        <p:cTn id="32" dur="1" fill="hold">
+                                          <p:stCondLst>
+                                            <p:cond delay="0"/>
+                                          </p:stCondLst>
+                                        </p:cTn>
+                                        <p:tgtEl>
+                                          <p:spTgt spid="14"/>
+                                        </p:tgtEl>
+                                        <p:attrNameLst>
+                                          <p:attrName>style.visibility</p:attrName>
+                                        </p:attrNameLst>
+                                      </p:cBhvr>
+                                      <p:to>
+                                        <p:strVal val="visible"/>
+                                      </p:to>
+                                    </p:set>
+                                    <p:animEffect transition="in" filter="fade">
+                                      <p:cBhvr>
+                                        <p:cTn id="33" dur="300"/>
+                                        <p:tgtEl>
+                                          <p:spTgt spid="14"/>
+                                        </p:tgtEl>
+                                      </p:cBhvr>
+                                    </p:animEffect>
+                                  </p:childTnLst>
+                                </p:cTn>
+                              </p:par>
+                              <p:par>
+                                <p:cTn id="34" presetID="10" presetClass="exit" presetSubtype="0" fill="hold" grpId="1" nodeType="withEffect">
+                                  <p:stCondLst>
+                                    <p:cond delay="0"/>
+                                  </p:stCondLst>
+                                  <p:childTnLst>
+                                    <p:animEffect transition="out" filter="fade">
+                                      <p:cBhvr>
+                                        <p:cTn id="35" dur="300"/>
+                                        <p:tgtEl>
+                                          <p:spTgt spid="13"/>
+                                        </p:tgtEl>
+                                      </p:cBhvr>
+                                    </p:animEffect>
+                                    <p:set>
+                                      <p:cBhvr>
+                                        <p:cTn id="36" dur="1" fill="hold">
+                                          <p:stCondLst>
+                                            <p:cond delay="299"/>
+                                          </p:stCondLst>
+                                        </p:cTn>
+                                        <p:tgtEl>
+                                          <p:spTgt spid="13"/>
+                                        </p:tgtEl>
+                                        <p:attrNameLst>
+                                          <p:attrName>style.visibility</p:attrName>
+                                        </p:attrNameLst>
+                                      </p:cBhvr>
+                                      <p:to>
+                                        <p:strVal val="hidden"/>
+                                      </p:to>
+                                    </p:set>
+                                  </p:childTnLst>
+                                </p:cTn>
+                              </p:par>
+                            </p:childTnLst>
+                          </p:cTn>
+                        </p:par>
+                      </p:childTnLst>
+                    </p:cTn>
+                  </p:par>
+                  <p:par>
+                    <p:cTn id="37" fill="hold">
+                      <p:stCondLst>
+                        <p:cond delay="indefinite"/>
+                      </p:stCondLst>
+                      <p:childTnLst>
+                        <p:par>
+                          <p:cTn id="38" fill="hold">
+                            <p:stCondLst>
+                              <p:cond delay="0"/>
+                            </p:stCondLst>
+                            <p:childTnLst>
+                              <p:par>
+                                <p:cTn id="39" presetID="10" presetClass="entr" presetSubtype="0" fill="hold" grpId="0" nodeType="clickEffect">
+                                  <p:stCondLst>
+                                    <p:cond delay="0"/>
+                                  </p:stCondLst>
+                                  <p:childTnLst>
+                                    <p:set>
+                                      <p:cBhvr>
+                                        <p:cTn id="40" dur="1" fill="hold">
+                                          <p:stCondLst>
+                                            <p:cond delay="0"/>
+                                          </p:stCondLst>
+                                        </p:cTn>
+                                        <p:tgtEl>
+                                          <p:spTgt spid="15"/>
+                                        </p:tgtEl>
+                                        <p:attrNameLst>
+                                          <p:attrName>style.visibility</p:attrName>
+                                        </p:attrNameLst>
+                                      </p:cBhvr>
+                                      <p:to>
+                                        <p:strVal val="visible"/>
+                                      </p:to>
+                                    </p:set>
+                                    <p:animEffect transition="in" filter="fade">
+                                      <p:cBhvr>
+                                        <p:cTn id="41" dur="300"/>
+                                        <p:tgtEl>
+                                          <p:spTgt spid="15"/>
+                                        </p:tgtEl>
+                                      </p:cBhvr>
+                                    </p:animEffect>
+                                  </p:childTnLst>
+                                </p:cTn>
+                              </p:par>
+                            </p:childTnLst>
+                          </p:cTn>
+                        </p:par>
+                      </p:childTnLst>
+                    </p:cTn>
+                  </p:par>
+                </p:childTnLst>
+              </p:cTn>
+              <p:prevCondLst>
+                <p:cond evt="onPrev" delay="0">
+                  <p:tgtEl>
+                    <p:sldTgt/>
+                  </p:tgtEl>
+                </p:cond>
+              </p:prevCondLst>
+              <p:nextCondLst>
+                <p:cond evt="onNext" delay="0">
+                  <p:tgtEl>
+                    <p:sldTgt/>
+                  </p:tgtEl>
+                </p:cond>
+              </p:nextCondLst>
+            </p:seq>
+          </p:childTnLst>
+        </p:cTn>
+      </p:par>
+    </p:tnLst>
+    <p:bldLst>
+      <p:bldP spid="12" grpId="0" animBg="1"/>
+      <p:bldP spid="12" grpId="1" animBg="1"/>
+      <p:bldP spid="13" grpId="0" animBg="1"/>
+      <p:bldP spid="13" grpId="1" animBg="1"/>
+      <p:bldP spid="15" grpId="0" animBg="1"/>
+      <p:bldP spid="11" grpId="0" animBg="1"/>
+      <p:bldP spid="11" grpId="1" animBg="1"/>
+    </p:bldLst>
+  </p:timing>
 </p:sld>
 </file>
 

</xml_diff>

<commit_message>
Minor updates before first session.
</commit_message>
<xml_diff>
--- a/Session 1 - Introduction to MATLAB/MATLAB Session 1.pptx
+++ b/Session 1 - Introduction to MATLAB/MATLAB Session 1.pptx
@@ -5,7 +5,7 @@
     <p:sldMasterId id="2147483678" r:id="rId1"/>
   </p:sldMasterIdLst>
   <p:notesMasterIdLst>
-    <p:notesMasterId r:id="rId72"/>
+    <p:notesMasterId r:id="rId73"/>
   </p:notesMasterIdLst>
   <p:sldIdLst>
     <p:sldId id="316" r:id="rId2"/>
@@ -78,6 +78,7 @@
     <p:sldId id="400" r:id="rId69"/>
     <p:sldId id="401" r:id="rId70"/>
     <p:sldId id="402" r:id="rId71"/>
+    <p:sldId id="408" r:id="rId72"/>
   </p:sldIdLst>
   <p:sldSz cx="12192000" cy="6858000"/>
   <p:notesSz cx="6669088" cy="9926638"/>
@@ -13029,7 +13030,53 @@
           </a:p>
           <a:p>
             <a:pPr lvl="1"/>
-            <a:endParaRPr lang="en-GB" sz="2400" dirty="0"/>
+            <a:r>
+              <a:rPr lang="en-GB" sz="2400" dirty="0"/>
+              <a:t>Clear specific variables by using their name </a:t>
+            </a:r>
+          </a:p>
+          <a:p>
+            <a:pPr lvl="2"/>
+            <a:r>
+              <a:rPr lang="en-GB" sz="2000" dirty="0"/>
+              <a:t>e.g. To remove a </a:t>
+            </a:r>
+            <a:r>
+              <a:rPr lang="en-GB" sz="2000"/>
+              <a:t>variable called “var_1”, </a:t>
+            </a:r>
+            <a:r>
+              <a:rPr lang="en-GB" sz="2000" dirty="0"/>
+              <a:t>use </a:t>
+            </a:r>
+            <a:r>
+              <a:rPr lang="en-GB" sz="2000" i="1" dirty="0">
+                <a:solidFill>
+                  <a:schemeClr val="accent1"/>
+                </a:solidFill>
+              </a:rPr>
+              <a:t>clear</a:t>
+            </a:r>
+            <a:r>
+              <a:rPr lang="en-GB" sz="2000" dirty="0">
+                <a:solidFill>
+                  <a:schemeClr val="accent1"/>
+                </a:solidFill>
+              </a:rPr>
+              <a:t> </a:t>
+            </a:r>
+            <a:r>
+              <a:rPr lang="en-GB" sz="2000" i="1" dirty="0">
+                <a:solidFill>
+                  <a:schemeClr val="accent1"/>
+                </a:solidFill>
+              </a:rPr>
+              <a:t>var_1</a:t>
+            </a:r>
+          </a:p>
+          <a:p>
+            <a:pPr lvl="2"/>
+            <a:endParaRPr lang="en-GB" sz="1200" dirty="0"/>
           </a:p>
           <a:p>
             <a:r>
@@ -37016,6 +37063,459 @@
     <p:extLst>
       <p:ext uri="{BB962C8B-B14F-4D97-AF65-F5344CB8AC3E}">
         <p14:creationId xmlns:p14="http://schemas.microsoft.com/office/powerpoint/2010/main" val="2521828519"/>
+      </p:ext>
+    </p:extLst>
+  </p:cSld>
+  <p:clrMapOvr>
+    <a:masterClrMapping/>
+  </p:clrMapOvr>
+  <mc:AlternateContent xmlns:mc="http://schemas.openxmlformats.org/markup-compatibility/2006" xmlns:p14="http://schemas.microsoft.com/office/powerpoint/2010/main">
+    <mc:Choice Requires="p14">
+      <p:transition p14:dur="300">
+        <p:fade/>
+      </p:transition>
+    </mc:Choice>
+    <mc:Fallback xmlns="">
+      <p:transition>
+        <p:fade/>
+      </p:transition>
+    </mc:Fallback>
+  </mc:AlternateContent>
+</p:sld>
+</file>
+
+<file path=ppt/slides/slide71.xml><?xml version="1.0" encoding="utf-8"?>
+<p:sld xmlns:a="http://schemas.openxmlformats.org/drawingml/2006/main" xmlns:r="http://schemas.openxmlformats.org/officeDocument/2006/relationships" xmlns:p="http://schemas.openxmlformats.org/presentationml/2006/main">
+  <p:cSld>
+    <p:spTree>
+      <p:nvGrpSpPr>
+        <p:cNvPr id="1" name=""/>
+        <p:cNvGrpSpPr/>
+        <p:nvPr/>
+      </p:nvGrpSpPr>
+      <p:grpSpPr>
+        <a:xfrm>
+          <a:off x="0" y="0"/>
+          <a:ext cx="0" cy="0"/>
+          <a:chOff x="0" y="0"/>
+          <a:chExt cx="0" cy="0"/>
+        </a:xfrm>
+      </p:grpSpPr>
+      <p:sp>
+        <p:nvSpPr>
+          <p:cNvPr id="2" name="Title 1">
+            <a:extLst>
+              <a:ext uri="{FF2B5EF4-FFF2-40B4-BE49-F238E27FC236}">
+                <a16:creationId xmlns:a16="http://schemas.microsoft.com/office/drawing/2014/main" id="{98B3C4F8-6083-4C32-A0D4-15ED3BB43F78}"/>
+              </a:ext>
+            </a:extLst>
+          </p:cNvPr>
+          <p:cNvSpPr>
+            <a:spLocks noGrp="1"/>
+          </p:cNvSpPr>
+          <p:nvPr>
+            <p:ph type="title"/>
+          </p:nvPr>
+        </p:nvSpPr>
+        <p:spPr/>
+        <p:txBody>
+          <a:bodyPr/>
+          <a:lstStyle/>
+          <a:p>
+            <a:r>
+              <a:rPr lang="en-GB" dirty="0"/>
+              <a:t>Under construction!</a:t>
+            </a:r>
+          </a:p>
+        </p:txBody>
+      </p:sp>
+      <p:sp>
+        <p:nvSpPr>
+          <p:cNvPr id="5" name="Content Placeholder 2">
+            <a:extLst>
+              <a:ext uri="{FF2B5EF4-FFF2-40B4-BE49-F238E27FC236}">
+                <a16:creationId xmlns:a16="http://schemas.microsoft.com/office/drawing/2014/main" id="{745436AD-830D-4C1D-80FA-646A4CAA0142}"/>
+              </a:ext>
+            </a:extLst>
+          </p:cNvPr>
+          <p:cNvSpPr txBox="1">
+            <a:spLocks/>
+          </p:cNvSpPr>
+          <p:nvPr/>
+        </p:nvSpPr>
+        <p:spPr>
+          <a:xfrm>
+            <a:off x="7341201" y="5060757"/>
+            <a:ext cx="4431297" cy="535461"/>
+          </a:xfrm>
+          <a:prstGeom prst="rect">
+            <a:avLst/>
+          </a:prstGeom>
+        </p:spPr>
+        <p:txBody>
+          <a:bodyPr/>
+          <a:lstStyle>
+            <a:lvl1pPr marL="342900" indent="-342900" algn="l" rtl="0" eaLnBrk="1" fontAlgn="base" hangingPunct="1">
+              <a:spcBef>
+                <a:spcPct val="20000"/>
+              </a:spcBef>
+              <a:spcAft>
+                <a:spcPct val="0"/>
+              </a:spcAft>
+              <a:buFont typeface="Arial" panose="020B0604020202020204" pitchFamily="34" charset="0"/>
+              <a:buChar char="•"/>
+              <a:defRPr sz="3200" kern="1200">
+                <a:solidFill>
+                  <a:schemeClr val="tx1"/>
+                </a:solidFill>
+                <a:latin typeface="+mn-lt"/>
+                <a:ea typeface="+mn-ea"/>
+                <a:cs typeface="+mn-cs"/>
+              </a:defRPr>
+            </a:lvl1pPr>
+            <a:lvl2pPr marL="742950" indent="-285750" algn="l" rtl="0" eaLnBrk="1" fontAlgn="base" hangingPunct="1">
+              <a:spcBef>
+                <a:spcPct val="20000"/>
+              </a:spcBef>
+              <a:spcAft>
+                <a:spcPct val="0"/>
+              </a:spcAft>
+              <a:buFont typeface="Arial" panose="020B0604020202020204" pitchFamily="34" charset="0"/>
+              <a:buChar char="•"/>
+              <a:defRPr sz="2800" kern="1200">
+                <a:solidFill>
+                  <a:srgbClr val="BF2F37"/>
+                </a:solidFill>
+                <a:latin typeface="+mn-lt"/>
+                <a:ea typeface="+mn-ea"/>
+                <a:cs typeface="+mn-cs"/>
+              </a:defRPr>
+            </a:lvl2pPr>
+            <a:lvl3pPr marL="1143000" indent="-228600" algn="l" rtl="0" eaLnBrk="1" fontAlgn="base" hangingPunct="1">
+              <a:spcBef>
+                <a:spcPct val="20000"/>
+              </a:spcBef>
+              <a:spcAft>
+                <a:spcPct val="0"/>
+              </a:spcAft>
+              <a:buFont typeface="Arial" panose="020B0604020202020204" pitchFamily="34" charset="0"/>
+              <a:buChar char="•"/>
+              <a:defRPr sz="2400" kern="1200">
+                <a:solidFill>
+                  <a:schemeClr val="tx1"/>
+                </a:solidFill>
+                <a:latin typeface="+mn-lt"/>
+                <a:ea typeface="+mn-ea"/>
+                <a:cs typeface="+mn-cs"/>
+              </a:defRPr>
+            </a:lvl3pPr>
+            <a:lvl4pPr marL="1600200" indent="-228600" algn="l" rtl="0" eaLnBrk="1" fontAlgn="base" hangingPunct="1">
+              <a:spcBef>
+                <a:spcPct val="20000"/>
+              </a:spcBef>
+              <a:spcAft>
+                <a:spcPct val="0"/>
+              </a:spcAft>
+              <a:buFont typeface="Arial" panose="020B0604020202020204" pitchFamily="34" charset="0"/>
+              <a:buChar char="–"/>
+              <a:defRPr sz="2000" kern="1200">
+                <a:solidFill>
+                  <a:schemeClr val="tx1"/>
+                </a:solidFill>
+                <a:latin typeface="+mn-lt"/>
+                <a:ea typeface="+mn-ea"/>
+                <a:cs typeface="+mn-cs"/>
+              </a:defRPr>
+            </a:lvl4pPr>
+            <a:lvl5pPr marL="2057400" indent="-228600" algn="l" rtl="0" eaLnBrk="1" fontAlgn="base" hangingPunct="1">
+              <a:spcBef>
+                <a:spcPct val="20000"/>
+              </a:spcBef>
+              <a:spcAft>
+                <a:spcPct val="0"/>
+              </a:spcAft>
+              <a:buFont typeface="Arial" pitchFamily="34" charset="0"/>
+              <a:buChar char="­"/>
+              <a:defRPr sz="2000" kern="1200">
+                <a:solidFill>
+                  <a:schemeClr val="tx1"/>
+                </a:solidFill>
+                <a:latin typeface="+mn-lt"/>
+                <a:ea typeface="+mn-ea"/>
+                <a:cs typeface="+mn-cs"/>
+              </a:defRPr>
+            </a:lvl5pPr>
+            <a:lvl6pPr marL="2514600" indent="-228600" algn="l" defTabSz="914400" rtl="0" eaLnBrk="1" latinLnBrk="0" hangingPunct="1">
+              <a:spcBef>
+                <a:spcPct val="20000"/>
+              </a:spcBef>
+              <a:buFont typeface="Arial" pitchFamily="34" charset="0"/>
+              <a:buChar char="•"/>
+              <a:defRPr sz="2000" kern="1200">
+                <a:solidFill>
+                  <a:schemeClr val="tx1"/>
+                </a:solidFill>
+                <a:latin typeface="+mn-lt"/>
+                <a:ea typeface="+mn-ea"/>
+                <a:cs typeface="+mn-cs"/>
+              </a:defRPr>
+            </a:lvl6pPr>
+            <a:lvl7pPr marL="2971800" indent="-228600" algn="l" defTabSz="914400" rtl="0" eaLnBrk="1" latinLnBrk="0" hangingPunct="1">
+              <a:spcBef>
+                <a:spcPct val="20000"/>
+              </a:spcBef>
+              <a:buFont typeface="Arial" pitchFamily="34" charset="0"/>
+              <a:buChar char="•"/>
+              <a:defRPr sz="2000" kern="1200">
+                <a:solidFill>
+                  <a:schemeClr val="tx1"/>
+                </a:solidFill>
+                <a:latin typeface="+mn-lt"/>
+                <a:ea typeface="+mn-ea"/>
+                <a:cs typeface="+mn-cs"/>
+              </a:defRPr>
+            </a:lvl7pPr>
+            <a:lvl8pPr marL="3429000" indent="-228600" algn="l" defTabSz="914400" rtl="0" eaLnBrk="1" latinLnBrk="0" hangingPunct="1">
+              <a:spcBef>
+                <a:spcPct val="20000"/>
+              </a:spcBef>
+              <a:buFont typeface="Arial" pitchFamily="34" charset="0"/>
+              <a:buChar char="•"/>
+              <a:defRPr sz="2000" kern="1200">
+                <a:solidFill>
+                  <a:schemeClr val="tx1"/>
+                </a:solidFill>
+                <a:latin typeface="+mn-lt"/>
+                <a:ea typeface="+mn-ea"/>
+                <a:cs typeface="+mn-cs"/>
+              </a:defRPr>
+            </a:lvl8pPr>
+            <a:lvl9pPr marL="3886200" indent="-228600" algn="l" defTabSz="914400" rtl="0" eaLnBrk="1" latinLnBrk="0" hangingPunct="1">
+              <a:spcBef>
+                <a:spcPct val="20000"/>
+              </a:spcBef>
+              <a:buFont typeface="Arial" pitchFamily="34" charset="0"/>
+              <a:buChar char="•"/>
+              <a:defRPr sz="2000" kern="1200">
+                <a:solidFill>
+                  <a:schemeClr val="tx1"/>
+                </a:solidFill>
+                <a:latin typeface="+mn-lt"/>
+                <a:ea typeface="+mn-ea"/>
+                <a:cs typeface="+mn-cs"/>
+              </a:defRPr>
+            </a:lvl9pPr>
+          </a:lstStyle>
+          <a:p>
+            <a:pPr marL="0" indent="0">
+              <a:buNone/>
+            </a:pPr>
+            <a:endParaRPr lang="en-GB" sz="2400" dirty="0"/>
+          </a:p>
+        </p:txBody>
+      </p:sp>
+      <p:grpSp>
+        <p:nvGrpSpPr>
+          <p:cNvPr id="12" name="Group 11">
+            <a:extLst>
+              <a:ext uri="{FF2B5EF4-FFF2-40B4-BE49-F238E27FC236}">
+                <a16:creationId xmlns:a16="http://schemas.microsoft.com/office/drawing/2014/main" id="{AE0910C3-83C7-4BD7-B1E4-BE01563AEC61}"/>
+              </a:ext>
+            </a:extLst>
+          </p:cNvPr>
+          <p:cNvGrpSpPr/>
+          <p:nvPr/>
+        </p:nvGrpSpPr>
+        <p:grpSpPr>
+          <a:xfrm>
+            <a:off x="2119250" y="2993993"/>
+            <a:ext cx="7953499" cy="1422906"/>
+            <a:chOff x="1619352" y="2877004"/>
+            <a:chExt cx="7953499" cy="1422906"/>
+          </a:xfrm>
+        </p:grpSpPr>
+        <p:sp>
+          <p:nvSpPr>
+            <p:cNvPr id="8" name="TextBox 7">
+              <a:extLst>
+                <a:ext uri="{FF2B5EF4-FFF2-40B4-BE49-F238E27FC236}">
+                  <a16:creationId xmlns:a16="http://schemas.microsoft.com/office/drawing/2014/main" id="{8175927A-B354-4981-8817-46E9FFCBE837}"/>
+                </a:ext>
+              </a:extLst>
+            </p:cNvPr>
+            <p:cNvSpPr txBox="1"/>
+            <p:nvPr/>
+          </p:nvSpPr>
+          <p:spPr>
+            <a:xfrm>
+              <a:off x="3622917" y="2926738"/>
+              <a:ext cx="3946369" cy="1323439"/>
+            </a:xfrm>
+            <a:prstGeom prst="rect">
+              <a:avLst/>
+            </a:prstGeom>
+            <a:noFill/>
+          </p:spPr>
+          <p:txBody>
+            <a:bodyPr wrap="square" rtlCol="0">
+              <a:spAutoFit/>
+            </a:bodyPr>
+            <a:lstStyle/>
+            <a:p>
+              <a:pPr algn="ctr"/>
+              <a:r>
+                <a:rPr lang="en-GB" sz="2800" dirty="0">
+                  <a:solidFill>
+                    <a:schemeClr val="tx1"/>
+                  </a:solidFill>
+                </a:rPr>
+                <a:t>Comments/requests?  </a:t>
+              </a:r>
+            </a:p>
+            <a:p>
+              <a:pPr algn="ctr"/>
+              <a:r>
+                <a:rPr lang="en-GB" sz="2800" dirty="0">
+                  <a:solidFill>
+                    <a:schemeClr val="tx1"/>
+                  </a:solidFill>
+                </a:rPr>
+                <a:t>Let me know!</a:t>
+              </a:r>
+            </a:p>
+            <a:p>
+              <a:pPr algn="ctr"/>
+              <a:r>
+                <a:rPr lang="en-GB" sz="2400" dirty="0">
+                  <a:solidFill>
+                    <a:srgbClr val="BF2F37"/>
+                  </a:solidFill>
+                </a:rPr>
+                <a:t>stephen.cross@bristol.ac.uk</a:t>
+              </a:r>
+            </a:p>
+          </p:txBody>
+        </p:sp>
+        <p:grpSp>
+          <p:nvGrpSpPr>
+            <p:cNvPr id="10" name="Group 9">
+              <a:extLst>
+                <a:ext uri="{FF2B5EF4-FFF2-40B4-BE49-F238E27FC236}">
+                  <a16:creationId xmlns:a16="http://schemas.microsoft.com/office/drawing/2014/main" id="{F222D1C0-0D79-44F7-945A-8AD0E3855214}"/>
+                </a:ext>
+              </a:extLst>
+            </p:cNvPr>
+            <p:cNvGrpSpPr/>
+            <p:nvPr/>
+          </p:nvGrpSpPr>
+          <p:grpSpPr>
+            <a:xfrm>
+              <a:off x="1619352" y="2877004"/>
+              <a:ext cx="7953499" cy="1422906"/>
+              <a:chOff x="1619352" y="2877004"/>
+              <a:chExt cx="7953499" cy="1422906"/>
+            </a:xfrm>
+          </p:grpSpPr>
+          <p:pic>
+            <p:nvPicPr>
+              <p:cNvPr id="1026" name="Picture 2" descr="See the source image">
+                <a:extLst>
+                  <a:ext uri="{FF2B5EF4-FFF2-40B4-BE49-F238E27FC236}">
+                    <a16:creationId xmlns:a16="http://schemas.microsoft.com/office/drawing/2014/main" id="{7F7C875F-2006-4A90-BBA3-6BB63A58DC42}"/>
+                  </a:ext>
+                </a:extLst>
+              </p:cNvPr>
+              <p:cNvPicPr>
+                <a:picLocks noChangeAspect="1" noChangeArrowheads="1"/>
+              </p:cNvPicPr>
+              <p:nvPr/>
+            </p:nvPicPr>
+            <p:blipFill>
+              <a:blip r:embed="rId2" cstate="print">
+                <a:extLst>
+                  <a:ext uri="{28A0092B-C50C-407E-A947-70E740481C1C}">
+                    <a14:useLocalDpi xmlns:a14="http://schemas.microsoft.com/office/drawing/2010/main" val="0"/>
+                  </a:ext>
+                </a:extLst>
+              </a:blip>
+              <a:srcRect/>
+              <a:stretch>
+                <a:fillRect/>
+              </a:stretch>
+            </p:blipFill>
+            <p:spPr bwMode="auto">
+              <a:xfrm>
+                <a:off x="7977024" y="2877004"/>
+                <a:ext cx="1595827" cy="1422905"/>
+              </a:xfrm>
+              <a:prstGeom prst="rect">
+                <a:avLst/>
+              </a:prstGeom>
+              <a:noFill/>
+              <a:extLst>
+                <a:ext uri="{909E8E84-426E-40DD-AFC4-6F175D3DCCD1}">
+                  <a14:hiddenFill xmlns:a14="http://schemas.microsoft.com/office/drawing/2010/main">
+                    <a:solidFill>
+                      <a:srgbClr val="FFFFFF"/>
+                    </a:solidFill>
+                  </a14:hiddenFill>
+                </a:ext>
+              </a:extLst>
+            </p:spPr>
+          </p:pic>
+          <p:pic>
+            <p:nvPicPr>
+              <p:cNvPr id="11" name="Picture 2" descr="See the source image">
+                <a:extLst>
+                  <a:ext uri="{FF2B5EF4-FFF2-40B4-BE49-F238E27FC236}">
+                    <a16:creationId xmlns:a16="http://schemas.microsoft.com/office/drawing/2014/main" id="{F34D1760-7935-47C7-B9F9-A129EE3F787B}"/>
+                  </a:ext>
+                </a:extLst>
+              </p:cNvPr>
+              <p:cNvPicPr>
+                <a:picLocks noChangeAspect="1" noChangeArrowheads="1"/>
+              </p:cNvPicPr>
+              <p:nvPr/>
+            </p:nvPicPr>
+            <p:blipFill>
+              <a:blip r:embed="rId2" cstate="print">
+                <a:extLst>
+                  <a:ext uri="{28A0092B-C50C-407E-A947-70E740481C1C}">
+                    <a14:useLocalDpi xmlns:a14="http://schemas.microsoft.com/office/drawing/2010/main" val="0"/>
+                  </a:ext>
+                </a:extLst>
+              </a:blip>
+              <a:srcRect/>
+              <a:stretch>
+                <a:fillRect/>
+              </a:stretch>
+            </p:blipFill>
+            <p:spPr bwMode="auto">
+              <a:xfrm>
+                <a:off x="1619352" y="2877005"/>
+                <a:ext cx="1595827" cy="1422905"/>
+              </a:xfrm>
+              <a:prstGeom prst="rect">
+                <a:avLst/>
+              </a:prstGeom>
+              <a:noFill/>
+              <a:extLst>
+                <a:ext uri="{909E8E84-426E-40DD-AFC4-6F175D3DCCD1}">
+                  <a14:hiddenFill xmlns:a14="http://schemas.microsoft.com/office/drawing/2010/main">
+                    <a:solidFill>
+                      <a:srgbClr val="FFFFFF"/>
+                    </a:solidFill>
+                  </a14:hiddenFill>
+                </a:ext>
+              </a:extLst>
+            </p:spPr>
+          </p:pic>
+        </p:grpSp>
+      </p:grpSp>
+    </p:spTree>
+    <p:extLst>
+      <p:ext uri="{BB962C8B-B14F-4D97-AF65-F5344CB8AC3E}">
+        <p14:creationId xmlns:p14="http://schemas.microsoft.com/office/powerpoint/2010/main" val="2118732688"/>
       </p:ext>
     </p:extLst>
   </p:cSld>

</xml_diff>